<commit_message>
Added third group exercise to data-viz-02
</commit_message>
<xml_diff>
--- a/data-viz-02/src/exercise-group.pptx
+++ b/data-viz-02/src/exercise-group.pptx
@@ -5,13 +5,14 @@
     <p:sldMasterId id="2147483648" r:id="rId1"/>
   </p:sldMasterIdLst>
   <p:notesMasterIdLst>
-    <p:NotesMasterId r:id="rId6"/>
+    <p:NotesMasterId r:id="rId7"/>
   </p:notesMasterIdLst>
   <p:sldIdLst>
     <p:sldId id="256" r:id="rId2"/>
     <p:sldId id="257" r:id="rId3"/>
     <p:sldId id="258" r:id="rId4"/>
     <p:sldId id="259" r:id="rId5"/>
+    <p:sldId id="260" r:id="rId6"/>
   </p:sldIdLst>
   <p:sldSz cx="9144000" cy="6858000" type="screen4x3"/>
   <p:notesSz cx="6858000" cy="9144000"/>
@@ -1135,6 +1136,212 @@
             <a:fld id="{18BDFEC3-8487-43E8-A154-7C12CBC1FFF2}" type="slidenum">
               <a:rPr lang="en-US"/>
               <a:t>3</a:t>
+            </a:fld>
+            <a:endParaRPr lang="en-US"/>
+          </a:p>
+        </p:txBody>
+      </p:sp>
+    </p:spTree>
+  </p:cSld>
+</p:notes>
+</file>
+
+<file path=ppt/notesSlides/notesSlide3.xml><?xml version="1.0" encoding="utf-8"?>
+<p:notes xmlns:a="http://schemas.openxmlformats.org/drawingml/2006/main" xmlns:r="http://schemas.openxmlformats.org/officeDocument/2006/relationships" xmlns:p="http://schemas.openxmlformats.org/presentationml/2006/main">
+  <p:cSld>
+    <p:spTree>
+      <p:nvGrpSpPr>
+        <p:cNvPr id="1" name=""/>
+        <p:cNvGrpSpPr/>
+        <p:nvPr/>
+      </p:nvGrpSpPr>
+      <p:grpSpPr>
+        <a:xfrm>
+          <a:off x="0" y="0"/>
+          <a:ext cx="0" cy="0"/>
+          <a:chOff x="0" y="0"/>
+          <a:chExt cx="0" cy="0"/>
+        </a:xfrm>
+      </p:grpSpPr>
+      <p:sp>
+        <p:nvSpPr>
+          <p:cNvPr id="2" name="Slide Image Placeholder 1"/>
+          <p:cNvSpPr>
+            <a:spLocks noGrp="1" noRot="1" noChangeAspect="1"/>
+          </p:cNvSpPr>
+          <p:nvPr>
+            <p:ph type="sldImg"/>
+          </p:nvPr>
+        </p:nvSpPr>
+        <p:spPr/>
+      </p:sp>
+      <p:sp>
+        <p:nvSpPr>
+          <p:cNvPr id="3" name="Notes Placeholder 2"/>
+          <p:cNvSpPr>
+            <a:spLocks noGrp="1"/>
+          </p:cNvSpPr>
+          <p:nvPr>
+            <p:ph type="body" idx="1"/>
+          </p:nvPr>
+        </p:nvSpPr>
+        <p:spPr/>
+        <p:txBody>
+          <a:bodyPr/>
+          <a:lstStyle/>
+          <a:p>
+            <a:pPr lvl="0" marL="0" indent="0">
+              <a:buNone/>
+            </a:pPr>
+            <a:r>
+              <a:rPr/>
+              <a:t>Mark</a:t>
+            </a:r>
+            <a:r>
+              <a:rPr/>
+              <a:t> </a:t>
+            </a:r>
+            <a:r>
+              <a:rPr/>
+              <a:t>Smirniotis.</a:t>
+            </a:r>
+            <a:r>
+              <a:rPr/>
+              <a:t> </a:t>
+            </a:r>
+            <a:r>
+              <a:rPr/>
+              <a:t>The</a:t>
+            </a:r>
+            <a:r>
+              <a:rPr/>
+              <a:t> </a:t>
+            </a:r>
+            <a:r>
+              <a:rPr/>
+              <a:t>Best</a:t>
+            </a:r>
+            <a:r>
+              <a:rPr/>
+              <a:t> </a:t>
+            </a:r>
+            <a:r>
+              <a:rPr/>
+              <a:t>VPN</a:t>
+            </a:r>
+            <a:r>
+              <a:rPr/>
+              <a:t> </a:t>
+            </a:r>
+            <a:r>
+              <a:rPr/>
+              <a:t>Service.</a:t>
+            </a:r>
+            <a:r>
+              <a:rPr/>
+              <a:t> </a:t>
+            </a:r>
+            <a:r>
+              <a:rPr/>
+              <a:t>Wirecutter,</a:t>
+            </a:r>
+            <a:r>
+              <a:rPr/>
+              <a:t> </a:t>
+            </a:r>
+            <a:r>
+              <a:rPr/>
+              <a:t>February</a:t>
+            </a:r>
+            <a:r>
+              <a:rPr/>
+              <a:t> </a:t>
+            </a:r>
+            <a:r>
+              <a:rPr/>
+              <a:t>8,</a:t>
+            </a:r>
+            <a:r>
+              <a:rPr/>
+              <a:t> </a:t>
+            </a:r>
+            <a:r>
+              <a:rPr/>
+              <a:t>2019.</a:t>
+            </a:r>
+            <a:r>
+              <a:rPr/>
+              <a:t> </a:t>
+            </a:r>
+            <a:r>
+              <a:rPr/>
+              <a:t>Retrieved</a:t>
+            </a:r>
+            <a:r>
+              <a:rPr/>
+              <a:t> </a:t>
+            </a:r>
+            <a:r>
+              <a:rPr/>
+              <a:t>August</a:t>
+            </a:r>
+            <a:r>
+              <a:rPr/>
+              <a:t> </a:t>
+            </a:r>
+            <a:r>
+              <a:rPr/>
+              <a:t>14,</a:t>
+            </a:r>
+            <a:r>
+              <a:rPr/>
+              <a:t> </a:t>
+            </a:r>
+            <a:r>
+              <a:rPr/>
+              <a:t>2019</a:t>
+            </a:r>
+            <a:r>
+              <a:rPr/>
+              <a:t> </a:t>
+            </a:r>
+            <a:r>
+              <a:rPr/>
+              <a:t>from</a:t>
+            </a:r>
+            <a:r>
+              <a:rPr/>
+              <a:t> </a:t>
+            </a:r>
+            <a:r>
+              <a:rPr/>
+              <a:t>https://thewirecutter.com/reviews/best-vpn-service/</a:t>
+            </a:r>
+            <a:r>
+              <a:rPr/>
+              <a:t>.</a:t>
+            </a:r>
+          </a:p>
+        </p:txBody>
+      </p:sp>
+      <p:sp>
+        <p:nvSpPr>
+          <p:cNvPr id="4" name="Slide Number Placeholder 3"/>
+          <p:cNvSpPr>
+            <a:spLocks noGrp="1"/>
+          </p:cNvSpPr>
+          <p:nvPr>
+            <p:ph type="sldNum" sz="quarter" idx="10"/>
+          </p:nvPr>
+        </p:nvSpPr>
+        <p:spPr/>
+        <p:txBody>
+          <a:bodyPr/>
+          <a:lstStyle/>
+          <a:p>
+            <a:fld id="{18BDFEC3-8487-43E8-A154-7C12CBC1FFF2}" type="slidenum">
+              <a:rPr lang="en-US"/>
+              <a:t>4</a:t>
             </a:fld>
             <a:endParaRPr lang="en-US"/>
           </a:p>
@@ -4318,7 +4525,7 @@
             </a:r>
             <a:r>
               <a:rPr/>
-              <a:t>3)</a:t>
+              <a:t>4)</a:t>
             </a:r>
           </a:p>
         </p:txBody>
@@ -4513,7 +4720,7 @@
             </a:r>
             <a:r>
               <a:rPr/>
-              <a:t>3)</a:t>
+              <a:t>4)</a:t>
             </a:r>
           </a:p>
         </p:txBody>
@@ -4716,7 +4923,202 @@
             </a:r>
             <a:r>
               <a:rPr/>
-              <a:t>3)</a:t>
+              <a:t>4)</a:t>
+            </a:r>
+          </a:p>
+        </p:txBody>
+      </p:sp>
+      <p:pic>
+        <p:nvPicPr>
+          <p:cNvPr descr="../images/vpn-speeds.png" id="0" name="Picture 1"/>
+          <p:cNvPicPr>
+            <a:picLocks noGrp="1" noChangeAspect="1"/>
+          </p:cNvPicPr>
+          <p:nvPr/>
+        </p:nvPicPr>
+        <p:blipFill>
+          <a:blip r:embed="rId3"/>
+          <a:stretch>
+            <a:fillRect/>
+          </a:stretch>
+        </p:blipFill>
+        <p:spPr bwMode="auto">
+          <a:xfrm>
+            <a:off x="1701800" y="1600200"/>
+            <a:ext cx="5740400" cy="4013200"/>
+          </a:xfrm>
+          <a:prstGeom prst="rect">
+            <a:avLst/>
+          </a:prstGeom>
+          <a:noFill/>
+          <a:ln w="9525">
+            <a:noFill/>
+            <a:headEnd/>
+            <a:tailEnd/>
+          </a:ln>
+        </p:spPr>
+      </p:pic>
+      <p:sp>
+        <p:nvSpPr>
+          <p:cNvPr id="1" name="TextBox 3"/>
+          <p:cNvSpPr txBox="1"/>
+          <p:nvPr/>
+        </p:nvSpPr>
+        <p:spPr>
+          <a:xfrm>
+            <a:off x="457200" y="5613400"/>
+            <a:ext cx="8229600" cy="508000"/>
+          </a:xfrm>
+          <a:prstGeom prst="rect">
+            <a:avLst/>
+          </a:prstGeom>
+          <a:noFill/>
+        </p:spPr>
+        <p:txBody>
+          <a:bodyPr/>
+          <a:lstStyle/>
+          <a:p>
+            <a:pPr lvl="0" marL="0" indent="0" algn="ctr">
+              <a:buNone/>
+            </a:pPr>
+            <a:r>
+              <a:rPr/>
+              <a:t>Bar</a:t>
+            </a:r>
+            <a:r>
+              <a:rPr/>
+              <a:t> </a:t>
+            </a:r>
+            <a:r>
+              <a:rPr/>
+              <a:t>chart</a:t>
+            </a:r>
+            <a:r>
+              <a:rPr/>
+              <a:t> </a:t>
+            </a:r>
+            <a:r>
+              <a:rPr/>
+              <a:t>showing</a:t>
+            </a:r>
+            <a:r>
+              <a:rPr/>
+              <a:t> </a:t>
+            </a:r>
+            <a:r>
+              <a:rPr/>
+              <a:t>speeds</a:t>
+            </a:r>
+            <a:r>
+              <a:rPr/>
+              <a:t> </a:t>
+            </a:r>
+            <a:r>
+              <a:rPr/>
+              <a:t>of</a:t>
+            </a:r>
+            <a:r>
+              <a:rPr/>
+              <a:t> </a:t>
+            </a:r>
+            <a:r>
+              <a:rPr/>
+              <a:t>various</a:t>
+            </a:r>
+            <a:r>
+              <a:rPr/>
+              <a:t> </a:t>
+            </a:r>
+            <a:r>
+              <a:rPr/>
+              <a:t>VPN</a:t>
+            </a:r>
+            <a:r>
+              <a:rPr/>
+              <a:t> </a:t>
+            </a:r>
+            <a:r>
+              <a:rPr/>
+              <a:t>providers</a:t>
+            </a:r>
+          </a:p>
+        </p:txBody>
+      </p:sp>
+    </p:spTree>
+  </p:cSld>
+</p:sld>
+</file>
+
+<file path=ppt/slides/slide5.xml><?xml version="1.0" encoding="utf-8"?>
+<p:sld xmlns:a="http://schemas.openxmlformats.org/drawingml/2006/main" xmlns:r="http://schemas.openxmlformats.org/officeDocument/2006/relationships" xmlns:p="http://schemas.openxmlformats.org/presentationml/2006/main">
+  <p:cSld>
+    <p:spTree>
+      <p:nvGrpSpPr>
+        <p:cNvPr id="1" name=""/>
+        <p:cNvGrpSpPr/>
+        <p:nvPr/>
+      </p:nvGrpSpPr>
+      <p:grpSpPr>
+        <a:xfrm>
+          <a:off x="0" y="0"/>
+          <a:ext cx="0" cy="0"/>
+          <a:chOff x="0" y="0"/>
+          <a:chExt cx="0" cy="0"/>
+        </a:xfrm>
+      </p:grpSpPr>
+      <p:sp>
+        <p:nvSpPr>
+          <p:cNvPr id="2" name="Title 1"/>
+          <p:cNvSpPr>
+            <a:spLocks noGrp="1"/>
+          </p:cNvSpPr>
+          <p:nvPr>
+            <p:ph type="title"/>
+          </p:nvPr>
+        </p:nvSpPr>
+        <p:spPr/>
+        <p:txBody>
+          <a:bodyPr/>
+          <a:lstStyle/>
+          <a:p>
+            <a:pPr lvl="0" marL="0" indent="0">
+              <a:buNone/>
+            </a:pPr>
+            <a:r>
+              <a:rPr/>
+              <a:t>Group</a:t>
+            </a:r>
+            <a:r>
+              <a:rPr/>
+              <a:t> </a:t>
+            </a:r>
+            <a:r>
+              <a:rPr/>
+              <a:t>exercise</a:t>
+            </a:r>
+            <a:r>
+              <a:rPr/>
+              <a:t> </a:t>
+            </a:r>
+            <a:r>
+              <a:rPr/>
+              <a:t>(4</a:t>
+            </a:r>
+            <a:r>
+              <a:rPr/>
+              <a:t> </a:t>
+            </a:r>
+            <a:r>
+              <a:rPr/>
+              <a:t>of</a:t>
+            </a:r>
+            <a:r>
+              <a:rPr/>
+              <a:t> </a:t>
+            </a:r>
+            <a:r>
+              <a:rPr/>
+              <a:t>4)</a:t>
             </a:r>
           </a:p>
         </p:txBody>
@@ -4757,7 +5159,24 @@
               <a:rPr>
                 <a:hlinkClick r:id="rId3"/>
               </a:rPr>
-              <a:t>Attacks by White Extremists Are Growing. So Are Their Connections.</a:t>
+              <a:t>Attacks by White Extremists Are Growing. So Are Their Connections</a:t>
+            </a:r>
+            <a:r>
+              <a:rPr/>
+              <a:t>.</a:t>
+            </a:r>
+          </a:p>
+          <a:p>
+            <a:pPr lvl="2"/>
+            <a:r>
+              <a:rPr>
+                <a:hlinkClick r:id="rId4"/>
+              </a:rPr>
+              <a:t>The Best VPN Service</a:t>
+            </a:r>
+            <a:r>
+              <a:rPr/>
+              <a:t>.</a:t>
             </a:r>
           </a:p>
           <a:p>

</xml_diff>